<commit_message>
onliine/offline version for presentation
</commit_message>
<xml_diff>
--- a/DOKUMENTE/Präsentation/Börsenspiel.pptx
+++ b/DOKUMENTE/Präsentation/Börsenspiel.pptx
@@ -117,7 +117,7 @@
   </p:defaultTextStyle>
   <p:extLst>
     <p:ext uri="{EFAFB233-063F-42B5-8137-9DF3F51BA10A}">
-      <p15:sldGuideLst xmlns:p15="http://schemas.microsoft.com/office/powerpoint/2012/main">
+      <p15:sldGuideLst xmlns:p15="http://schemas.microsoft.com/office/powerpoint/2012/main" xmlns="">
         <p15:guide id="1" orient="horz" pos="2160">
           <p15:clr>
             <a:srgbClr val="A4A3A4"/>
@@ -156,7 +156,7 @@
       </p15:sldGuideLst>
     </p:ext>
     <p:ext uri="{2D200454-40CA-4A62-9FC3-DE9A4176ACB9}">
-      <p15:notesGuideLst xmlns:p15="http://schemas.microsoft.com/office/powerpoint/2012/main">
+      <p15:notesGuideLst xmlns:p15="http://schemas.microsoft.com/office/powerpoint/2012/main" xmlns="">
         <p15:guide id="1" orient="horz" pos="2880">
           <p15:clr>
             <a:srgbClr val="A4A3A4"/>
@@ -255,7 +255,7 @@
           <a:p>
             <a:fld id="{FE5B4EDC-59C0-49C7-8ADA-5A781B329E02}" type="datetimeFigureOut">
               <a:rPr lang="de-DE"/>
-              <a:t>21.01.2014</a:t>
+              <a:t>22.01.2014</a:t>
             </a:fld>
             <a:endParaRPr/>
           </a:p>
@@ -420,7 +420,7 @@
           <a:p>
             <a:fld id="{F2D8D46A-B586-417D-BFBD-8C8FE0AAF762}" type="datetimeFigureOut">
               <a:rPr lang="de-DE"/>
-              <a:t>21.01.2014</a:t>
+              <a:t>22.01.2014</a:t>
             </a:fld>
             <a:endParaRPr/>
           </a:p>
@@ -2045,7 +2045,7 @@
           <a:p>
             <a:fld id="{F0DFD029-FB74-4578-B929-F66AA97659CA}" type="datetimeFigureOut">
               <a:rPr lang="de-DE" noProof="0" smtClean="0"/>
-              <a:t>21.01.2014</a:t>
+              <a:t>22.01.2014</a:t>
             </a:fld>
             <a:endParaRPr lang="de-DE" noProof="0" dirty="0"/>
           </a:p>
@@ -2250,7 +2250,7 @@
           <a:p>
             <a:fld id="{F0DFD029-FB74-4578-B929-F66AA97659CA}" type="datetimeFigureOut">
               <a:rPr lang="de-DE" noProof="0" smtClean="0"/>
-              <a:t>21.01.2014</a:t>
+              <a:t>22.01.2014</a:t>
             </a:fld>
             <a:endParaRPr lang="de-DE" noProof="0" dirty="0"/>
           </a:p>
@@ -2465,7 +2465,7 @@
           <a:p>
             <a:fld id="{F0DFD029-FB74-4578-B929-F66AA97659CA}" type="datetimeFigureOut">
               <a:rPr lang="de-DE" noProof="0" smtClean="0"/>
-              <a:t>21.01.2014</a:t>
+              <a:t>22.01.2014</a:t>
             </a:fld>
             <a:endParaRPr lang="de-DE" noProof="0" dirty="0"/>
           </a:p>
@@ -2670,7 +2670,7 @@
           <a:p>
             <a:fld id="{F0DFD029-FB74-4578-B929-F66AA97659CA}" type="datetimeFigureOut">
               <a:rPr lang="de-DE" noProof="0" smtClean="0"/>
-              <a:t>21.01.2014</a:t>
+              <a:t>22.01.2014</a:t>
             </a:fld>
             <a:endParaRPr lang="de-DE" noProof="0" dirty="0"/>
           </a:p>
@@ -2940,7 +2940,7 @@
           <a:p>
             <a:fld id="{F0DFD029-FB74-4578-B929-F66AA97659CA}" type="datetimeFigureOut">
               <a:rPr lang="de-DE" noProof="0" smtClean="0"/>
-              <a:t>21.01.2014</a:t>
+              <a:t>22.01.2014</a:t>
             </a:fld>
             <a:endParaRPr lang="de-DE" noProof="0" dirty="0"/>
           </a:p>
@@ -3425,7 +3425,7 @@
           <a:p>
             <a:fld id="{F0DFD029-FB74-4578-B929-F66AA97659CA}" type="datetimeFigureOut">
               <a:rPr lang="de-DE" noProof="0" smtClean="0"/>
-              <a:t>21.01.2014</a:t>
+              <a:t>22.01.2014</a:t>
             </a:fld>
             <a:endParaRPr lang="de-DE" noProof="0" dirty="0"/>
           </a:p>
@@ -3893,7 +3893,7 @@
           <a:p>
             <a:fld id="{F0DFD029-FB74-4578-B929-F66AA97659CA}" type="datetimeFigureOut">
               <a:rPr lang="de-DE" noProof="0" smtClean="0"/>
-              <a:t>21.01.2014</a:t>
+              <a:t>22.01.2014</a:t>
             </a:fld>
             <a:endParaRPr lang="de-DE" noProof="0" dirty="0"/>
           </a:p>
@@ -4030,7 +4030,7 @@
           <a:p>
             <a:fld id="{F0DFD029-FB74-4578-B929-F66AA97659CA}" type="datetimeFigureOut">
               <a:rPr lang="de-DE" noProof="0" smtClean="0"/>
-              <a:t>21.01.2014</a:t>
+              <a:t>22.01.2014</a:t>
             </a:fld>
             <a:endParaRPr lang="de-DE" noProof="0" dirty="0"/>
           </a:p>
@@ -4144,7 +4144,7 @@
           <a:p>
             <a:fld id="{F0DFD029-FB74-4578-B929-F66AA97659CA}" type="datetimeFigureOut">
               <a:rPr lang="de-DE" noProof="0" smtClean="0"/>
-              <a:t>21.01.2014</a:t>
+              <a:t>22.01.2014</a:t>
             </a:fld>
             <a:endParaRPr lang="de-DE" noProof="0" dirty="0"/>
           </a:p>
@@ -4450,7 +4450,7 @@
           <a:p>
             <a:fld id="{F0DFD029-FB74-4578-B929-F66AA97659CA}" type="datetimeFigureOut">
               <a:rPr lang="de-DE" noProof="0" smtClean="0"/>
-              <a:t>21.01.2014</a:t>
+              <a:t>22.01.2014</a:t>
             </a:fld>
             <a:endParaRPr lang="de-DE" noProof="0" dirty="0"/>
           </a:p>
@@ -4745,7 +4745,7 @@
           <a:p>
             <a:fld id="{F0DFD029-FB74-4578-B929-F66AA97659CA}" type="datetimeFigureOut">
               <a:rPr lang="de-DE" noProof="0" smtClean="0"/>
-              <a:t>21.01.2014</a:t>
+              <a:t>22.01.2014</a:t>
             </a:fld>
             <a:endParaRPr lang="de-DE" noProof="0" dirty="0"/>
           </a:p>
@@ -5375,7 +5375,7 @@
             <a:fld id="{F0DFD029-FB74-4578-B929-F66AA97659CA}" type="datetimeFigureOut">
               <a:rPr lang="de-DE" noProof="0" smtClean="0"/>
               <a:pPr/>
-              <a:t>21.01.2014</a:t>
+              <a:t>22.01.2014</a:t>
             </a:fld>
             <a:endParaRPr lang="de-DE" noProof="0" dirty="0"/>
           </a:p>

</xml_diff>